<commit_message>
Update Smart Home system- Ideas and Scenarios.pptx
</commit_message>
<xml_diff>
--- a/Project 6/Smart Home system- Ideas and Scenarios.pptx
+++ b/Project 6/Smart Home system- Ideas and Scenarios.pptx
@@ -37,7 +37,9 @@
     <p:sldId id="306" r:id="rId31"/>
     <p:sldId id="307" r:id="rId32"/>
     <p:sldId id="308" r:id="rId33"/>
-    <p:sldId id="271" r:id="rId34"/>
+    <p:sldId id="309" r:id="rId34"/>
+    <p:sldId id="310" r:id="rId35"/>
+    <p:sldId id="271" r:id="rId36"/>
   </p:sldIdLst>
   <p:sldSz cx="12192000" cy="6858000"/>
   <p:notesSz cx="6858000" cy="9144000"/>
@@ -136,6 +138,11 @@
       </a:defRPr>
     </a:lvl9pPr>
   </p:defaultTextStyle>
+  <p:extLst>
+    <p:ext uri="{EFAFB233-063F-42B5-8137-9DF3F51BA10A}">
+      <p15:sldGuideLst xmlns:p15="http://schemas.microsoft.com/office/powerpoint/2012/main"/>
+    </p:ext>
+  </p:extLst>
 </p:presentation>
 </file>
 
@@ -11915,6 +11922,171 @@
           <p:cNvPr id="2" name="Title 1">
             <a:extLst>
               <a:ext uri="{FF2B5EF4-FFF2-40B4-BE49-F238E27FC236}">
+                <a16:creationId xmlns:a16="http://schemas.microsoft.com/office/drawing/2014/main" id="{D863B09D-0EB0-46D9-A1DD-2F77EE03AC64}"/>
+              </a:ext>
+            </a:extLst>
+          </p:cNvPr>
+          <p:cNvSpPr>
+            <a:spLocks noGrp="1"/>
+          </p:cNvSpPr>
+          <p:nvPr>
+            <p:ph type="title"/>
+          </p:nvPr>
+        </p:nvSpPr>
+        <p:spPr>
+          <a:xfrm>
+            <a:off x="945204" y="2339840"/>
+            <a:ext cx="10515600" cy="2170016"/>
+          </a:xfrm>
+        </p:spPr>
+        <p:txBody>
+          <a:bodyPr>
+            <a:normAutofit/>
+          </a:bodyPr>
+          <a:lstStyle/>
+          <a:p>
+            <a:pPr algn="ctr"/>
+            <a:r>
+              <a:rPr lang="de-DE" sz="4800" dirty="0">
+                <a:latin typeface="Adobe Heiti Std R" panose="020B0400000000000000" pitchFamily="34" charset="-128"/>
+                <a:ea typeface="Adobe Heiti Std R" panose="020B0400000000000000" pitchFamily="34" charset="-128"/>
+              </a:rPr>
+              <a:t>Sequence Diagram</a:t>
+            </a:r>
+            <a:br>
+              <a:rPr lang="de-DE" sz="4800" dirty="0">
+                <a:latin typeface="Adobe Heiti Std R" panose="020B0400000000000000" pitchFamily="34" charset="-128"/>
+                <a:ea typeface="Adobe Heiti Std R" panose="020B0400000000000000" pitchFamily="34" charset="-128"/>
+              </a:rPr>
+            </a:br>
+            <a:r>
+              <a:rPr lang="de-DE" sz="4800" dirty="0">
+                <a:latin typeface="Adobe Heiti Std R" panose="020B0400000000000000" pitchFamily="34" charset="-128"/>
+                <a:ea typeface="Adobe Heiti Std R" panose="020B0400000000000000" pitchFamily="34" charset="-128"/>
+              </a:rPr>
+              <a:t>For</a:t>
+            </a:r>
+            <a:br>
+              <a:rPr lang="de-DE" sz="4800" dirty="0">
+                <a:latin typeface="Adobe Heiti Std R" panose="020B0400000000000000" pitchFamily="34" charset="-128"/>
+                <a:ea typeface="Adobe Heiti Std R" panose="020B0400000000000000" pitchFamily="34" charset="-128"/>
+              </a:rPr>
+            </a:br>
+            <a:r>
+              <a:rPr lang="de-DE" sz="4800" dirty="0">
+                <a:latin typeface="Adobe Heiti Std R" panose="020B0400000000000000" pitchFamily="34" charset="-128"/>
+                <a:ea typeface="Adobe Heiti Std R" panose="020B0400000000000000" pitchFamily="34" charset="-128"/>
+              </a:rPr>
+              <a:t>Smart Home System</a:t>
+            </a:r>
+            <a:endParaRPr lang="en-CA" sz="4800" dirty="0">
+              <a:latin typeface="Adobe Heiti Std R" panose="020B0400000000000000" pitchFamily="34" charset="-128"/>
+              <a:ea typeface="Adobe Heiti Std R" panose="020B0400000000000000" pitchFamily="34" charset="-128"/>
+            </a:endParaRPr>
+          </a:p>
+        </p:txBody>
+      </p:sp>
+    </p:spTree>
+    <p:extLst>
+      <p:ext uri="{BB962C8B-B14F-4D97-AF65-F5344CB8AC3E}">
+        <p14:creationId xmlns:p14="http://schemas.microsoft.com/office/powerpoint/2010/main" val="4227583303"/>
+      </p:ext>
+    </p:extLst>
+  </p:cSld>
+  <p:clrMapOvr>
+    <a:masterClrMapping/>
+  </p:clrMapOvr>
+</p:sld>
+</file>
+
+<file path=ppt/slides/slide34.xml><?xml version="1.0" encoding="utf-8"?>
+<p:sld xmlns:a="http://schemas.openxmlformats.org/drawingml/2006/main" xmlns:r="http://schemas.openxmlformats.org/officeDocument/2006/relationships" xmlns:p="http://schemas.openxmlformats.org/presentationml/2006/main">
+  <p:cSld>
+    <p:spTree>
+      <p:nvGrpSpPr>
+        <p:cNvPr id="1" name=""/>
+        <p:cNvGrpSpPr/>
+        <p:nvPr/>
+      </p:nvGrpSpPr>
+      <p:grpSpPr>
+        <a:xfrm>
+          <a:off x="0" y="0"/>
+          <a:ext cx="0" cy="0"/>
+          <a:chOff x="0" y="0"/>
+          <a:chExt cx="0" cy="0"/>
+        </a:xfrm>
+      </p:grpSpPr>
+      <p:pic>
+        <p:nvPicPr>
+          <p:cNvPr id="5" name="Picture 4">
+            <a:extLst>
+              <a:ext uri="{FF2B5EF4-FFF2-40B4-BE49-F238E27FC236}">
+                <a16:creationId xmlns:a16="http://schemas.microsoft.com/office/drawing/2014/main" id="{9757A549-FC6E-4CB1-8B4B-7064F2DDC0A9}"/>
+              </a:ext>
+            </a:extLst>
+          </p:cNvPr>
+          <p:cNvPicPr>
+            <a:picLocks noChangeAspect="1"/>
+          </p:cNvPicPr>
+          <p:nvPr/>
+        </p:nvPicPr>
+        <p:blipFill>
+          <a:blip r:embed="rId2">
+            <a:extLst>
+              <a:ext uri="{28A0092B-C50C-407E-A947-70E740481C1C}">
+                <a14:useLocalDpi xmlns:a14="http://schemas.microsoft.com/office/drawing/2010/main" val="0"/>
+              </a:ext>
+            </a:extLst>
+          </a:blip>
+          <a:stretch>
+            <a:fillRect/>
+          </a:stretch>
+        </p:blipFill>
+        <p:spPr>
+          <a:xfrm>
+            <a:off x="0" y="971812"/>
+            <a:ext cx="12192000" cy="4914375"/>
+          </a:xfrm>
+          <a:prstGeom prst="rect">
+            <a:avLst/>
+          </a:prstGeom>
+        </p:spPr>
+      </p:pic>
+    </p:spTree>
+    <p:extLst>
+      <p:ext uri="{BB962C8B-B14F-4D97-AF65-F5344CB8AC3E}">
+        <p14:creationId xmlns:p14="http://schemas.microsoft.com/office/powerpoint/2010/main" val="2209842064"/>
+      </p:ext>
+    </p:extLst>
+  </p:cSld>
+  <p:clrMapOvr>
+    <a:masterClrMapping/>
+  </p:clrMapOvr>
+</p:sld>
+</file>
+
+<file path=ppt/slides/slide35.xml><?xml version="1.0" encoding="utf-8"?>
+<p:sld xmlns:a="http://schemas.openxmlformats.org/drawingml/2006/main" xmlns:r="http://schemas.openxmlformats.org/officeDocument/2006/relationships" xmlns:p="http://schemas.openxmlformats.org/presentationml/2006/main">
+  <p:cSld>
+    <p:spTree>
+      <p:nvGrpSpPr>
+        <p:cNvPr id="1" name=""/>
+        <p:cNvGrpSpPr/>
+        <p:nvPr/>
+      </p:nvGrpSpPr>
+      <p:grpSpPr>
+        <a:xfrm>
+          <a:off x="0" y="0"/>
+          <a:ext cx="0" cy="0"/>
+          <a:chOff x="0" y="0"/>
+          <a:chExt cx="0" cy="0"/>
+        </a:xfrm>
+      </p:grpSpPr>
+      <p:sp>
+        <p:nvSpPr>
+          <p:cNvPr id="2" name="Title 1">
+            <a:extLst>
+              <a:ext uri="{FF2B5EF4-FFF2-40B4-BE49-F238E27FC236}">
                 <a16:creationId xmlns:a16="http://schemas.microsoft.com/office/drawing/2014/main" id="{A45F80EC-8706-4D2F-9071-88B538145B98}"/>
               </a:ext>
             </a:extLst>

</xml_diff>